<commit_message>
inversão de slides: scratch e hour of code
</commit_message>
<xml_diff>
--- a/introducao-a-logica.pptx
+++ b/introducao-a-logica.pptx
@@ -8,8 +8,8 @@
     <p:sldId id="256" r:id="rId2"/>
     <p:sldId id="258" r:id="rId3"/>
     <p:sldId id="259" r:id="rId4"/>
-    <p:sldId id="260" r:id="rId5"/>
-    <p:sldId id="261" r:id="rId6"/>
+    <p:sldId id="261" r:id="rId5"/>
+    <p:sldId id="260" r:id="rId6"/>
   </p:sldIdLst>
   <p:sldSz cx="12192000" cy="6858000"/>
   <p:notesSz cx="6858000" cy="9144000"/>
@@ -180,10 +180,9 @@
           </a:lstStyle>
           <a:p>
             <a:r>
-              <a:rPr lang="pt-BR" smtClean="0"/>
+              <a:rPr lang="pt-BR"/>
               <a:t>Clique para editar o título mestre</a:t>
             </a:r>
-            <a:endParaRPr lang="pt-BR"/>
           </a:p>
         </p:txBody>
       </p:sp>
@@ -253,10 +252,9 @@
           </a:lstStyle>
           <a:p>
             <a:r>
-              <a:rPr lang="pt-BR" smtClean="0"/>
+              <a:rPr lang="pt-BR"/>
               <a:t>Clique para editar o estilo do subtítulo mestre</a:t>
             </a:r>
-            <a:endParaRPr lang="pt-BR"/>
           </a:p>
         </p:txBody>
       </p:sp>
@@ -277,7 +275,7 @@
           <a:p>
             <a:fld id="{9642BF85-54FF-46CE-B398-87F998CFD60B}" type="datetimeFigureOut">
               <a:rPr lang="pt-BR" smtClean="0"/>
-              <a:t>27/01/2017</a:t>
+              <a:t>08/04/2020</a:t>
             </a:fld>
             <a:endParaRPr lang="pt-BR"/>
           </a:p>
@@ -335,13 +333,6 @@
   <p:clrMapOvr>
     <a:masterClrMapping/>
   </p:clrMapOvr>
-  <p:timing>
-    <p:tnLst>
-      <p:par>
-        <p:cTn id="1" dur="indefinite" restart="never" nodeType="tmRoot"/>
-      </p:par>
-    </p:tnLst>
-  </p:timing>
 </p:sldLayout>
 </file>
 
@@ -378,10 +369,9 @@
           <a:lstStyle/>
           <a:p>
             <a:r>
-              <a:rPr lang="pt-BR" smtClean="0"/>
+              <a:rPr lang="pt-BR"/>
               <a:t>Clique para editar o título mestre</a:t>
             </a:r>
-            <a:endParaRPr lang="pt-BR"/>
           </a:p>
         </p:txBody>
       </p:sp>
@@ -402,38 +392,37 @@
           <a:p>
             <a:pPr lvl="0"/>
             <a:r>
-              <a:rPr lang="pt-BR" smtClean="0"/>
+              <a:rPr lang="pt-BR"/>
               <a:t>Clique para editar o texto mestre</a:t>
             </a:r>
           </a:p>
           <a:p>
             <a:pPr lvl="1"/>
             <a:r>
-              <a:rPr lang="pt-BR" smtClean="0"/>
+              <a:rPr lang="pt-BR"/>
               <a:t>Segundo nível</a:t>
             </a:r>
           </a:p>
           <a:p>
             <a:pPr lvl="2"/>
             <a:r>
-              <a:rPr lang="pt-BR" smtClean="0"/>
+              <a:rPr lang="pt-BR"/>
               <a:t>Terceiro nível</a:t>
             </a:r>
           </a:p>
           <a:p>
             <a:pPr lvl="3"/>
             <a:r>
-              <a:rPr lang="pt-BR" smtClean="0"/>
+              <a:rPr lang="pt-BR"/>
               <a:t>Quarto nível</a:t>
             </a:r>
           </a:p>
           <a:p>
             <a:pPr lvl="4"/>
             <a:r>
-              <a:rPr lang="pt-BR" smtClean="0"/>
+              <a:rPr lang="pt-BR"/>
               <a:t>Quinto nível</a:t>
             </a:r>
-            <a:endParaRPr lang="pt-BR"/>
           </a:p>
         </p:txBody>
       </p:sp>
@@ -454,7 +443,7 @@
           <a:p>
             <a:fld id="{9642BF85-54FF-46CE-B398-87F998CFD60B}" type="datetimeFigureOut">
               <a:rPr lang="pt-BR" smtClean="0"/>
-              <a:t>27/01/2017</a:t>
+              <a:t>08/04/2020</a:t>
             </a:fld>
             <a:endParaRPr lang="pt-BR"/>
           </a:p>
@@ -512,13 +501,6 @@
   <p:clrMapOvr>
     <a:masterClrMapping/>
   </p:clrMapOvr>
-  <p:timing>
-    <p:tnLst>
-      <p:par>
-        <p:cTn id="1" dur="indefinite" restart="never" nodeType="tmRoot"/>
-      </p:par>
-    </p:tnLst>
-  </p:timing>
 </p:sldLayout>
 </file>
 
@@ -560,10 +542,9 @@
           <a:lstStyle/>
           <a:p>
             <a:r>
-              <a:rPr lang="pt-BR" smtClean="0"/>
+              <a:rPr lang="pt-BR"/>
               <a:t>Clique para editar o título mestre</a:t>
             </a:r>
-            <a:endParaRPr lang="pt-BR"/>
           </a:p>
         </p:txBody>
       </p:sp>
@@ -589,38 +570,37 @@
           <a:p>
             <a:pPr lvl="0"/>
             <a:r>
-              <a:rPr lang="pt-BR" smtClean="0"/>
+              <a:rPr lang="pt-BR"/>
               <a:t>Clique para editar o texto mestre</a:t>
             </a:r>
           </a:p>
           <a:p>
             <a:pPr lvl="1"/>
             <a:r>
-              <a:rPr lang="pt-BR" smtClean="0"/>
+              <a:rPr lang="pt-BR"/>
               <a:t>Segundo nível</a:t>
             </a:r>
           </a:p>
           <a:p>
             <a:pPr lvl="2"/>
             <a:r>
-              <a:rPr lang="pt-BR" smtClean="0"/>
+              <a:rPr lang="pt-BR"/>
               <a:t>Terceiro nível</a:t>
             </a:r>
           </a:p>
           <a:p>
             <a:pPr lvl="3"/>
             <a:r>
-              <a:rPr lang="pt-BR" smtClean="0"/>
+              <a:rPr lang="pt-BR"/>
               <a:t>Quarto nível</a:t>
             </a:r>
           </a:p>
           <a:p>
             <a:pPr lvl="4"/>
             <a:r>
-              <a:rPr lang="pt-BR" smtClean="0"/>
+              <a:rPr lang="pt-BR"/>
               <a:t>Quinto nível</a:t>
             </a:r>
-            <a:endParaRPr lang="pt-BR"/>
           </a:p>
         </p:txBody>
       </p:sp>
@@ -641,7 +621,7 @@
           <a:p>
             <a:fld id="{9642BF85-54FF-46CE-B398-87F998CFD60B}" type="datetimeFigureOut">
               <a:rPr lang="pt-BR" smtClean="0"/>
-              <a:t>27/01/2017</a:t>
+              <a:t>08/04/2020</a:t>
             </a:fld>
             <a:endParaRPr lang="pt-BR"/>
           </a:p>
@@ -699,13 +679,6 @@
   <p:clrMapOvr>
     <a:masterClrMapping/>
   </p:clrMapOvr>
-  <p:timing>
-    <p:tnLst>
-      <p:par>
-        <p:cTn id="1" dur="indefinite" restart="never" nodeType="tmRoot"/>
-      </p:par>
-    </p:tnLst>
-  </p:timing>
 </p:sldLayout>
 </file>
 
@@ -775,10 +748,9 @@
           </a:lstStyle>
           <a:p>
             <a:r>
-              <a:rPr lang="pt-BR" dirty="0" smtClean="0"/>
+              <a:rPr lang="pt-BR" dirty="0"/>
               <a:t>Clique para editar o título mestre</a:t>
             </a:r>
-            <a:endParaRPr lang="pt-BR" dirty="0"/>
           </a:p>
         </p:txBody>
       </p:sp>
@@ -861,38 +833,37 @@
           <a:p>
             <a:pPr lvl="0"/>
             <a:r>
-              <a:rPr lang="pt-BR" dirty="0" smtClean="0"/>
+              <a:rPr lang="pt-BR" dirty="0"/>
               <a:t>Clique para editar o texto mestre</a:t>
             </a:r>
           </a:p>
           <a:p>
             <a:pPr lvl="1"/>
             <a:r>
-              <a:rPr lang="pt-BR" dirty="0" smtClean="0"/>
+              <a:rPr lang="pt-BR" dirty="0"/>
               <a:t>Segundo nível</a:t>
             </a:r>
           </a:p>
           <a:p>
             <a:pPr lvl="2"/>
             <a:r>
-              <a:rPr lang="pt-BR" dirty="0" smtClean="0"/>
+              <a:rPr lang="pt-BR" dirty="0"/>
               <a:t>Terceiro nível</a:t>
             </a:r>
           </a:p>
           <a:p>
             <a:pPr lvl="3"/>
             <a:r>
-              <a:rPr lang="pt-BR" dirty="0" smtClean="0"/>
+              <a:rPr lang="pt-BR" dirty="0"/>
               <a:t>Quarto nível</a:t>
             </a:r>
           </a:p>
           <a:p>
             <a:pPr lvl="4"/>
             <a:r>
-              <a:rPr lang="pt-BR" dirty="0" smtClean="0"/>
+              <a:rPr lang="pt-BR" dirty="0"/>
               <a:t>Quinto nível</a:t>
             </a:r>
-            <a:endParaRPr lang="pt-BR" dirty="0"/>
           </a:p>
         </p:txBody>
       </p:sp>
@@ -913,7 +884,7 @@
           <a:p>
             <a:fld id="{9642BF85-54FF-46CE-B398-87F998CFD60B}" type="datetimeFigureOut">
               <a:rPr lang="pt-BR" smtClean="0"/>
-              <a:t>27/01/2017</a:t>
+              <a:t>08/04/2020</a:t>
             </a:fld>
             <a:endParaRPr lang="pt-BR"/>
           </a:p>
@@ -971,13 +942,6 @@
   <p:clrMapOvr>
     <a:masterClrMapping/>
   </p:clrMapOvr>
-  <p:timing>
-    <p:tnLst>
-      <p:par>
-        <p:cTn id="1" dur="indefinite" restart="never" nodeType="tmRoot"/>
-      </p:par>
-    </p:tnLst>
-  </p:timing>
 </p:sldLayout>
 </file>
 
@@ -1047,10 +1011,9 @@
           </a:lstStyle>
           <a:p>
             <a:r>
-              <a:rPr lang="pt-BR" dirty="0" smtClean="0"/>
+              <a:rPr lang="pt-BR" dirty="0"/>
               <a:t>Clique para editar o título mestre</a:t>
             </a:r>
-            <a:endParaRPr lang="pt-BR" dirty="0"/>
           </a:p>
         </p:txBody>
       </p:sp>
@@ -1169,7 +1132,7 @@
           <a:p>
             <a:pPr lvl="0"/>
             <a:r>
-              <a:rPr lang="pt-BR" dirty="0" smtClean="0"/>
+              <a:rPr lang="pt-BR" dirty="0"/>
               <a:t>Clique para editar o texto mestre</a:t>
             </a:r>
           </a:p>
@@ -1192,7 +1155,7 @@
           <a:p>
             <a:fld id="{9642BF85-54FF-46CE-B398-87F998CFD60B}" type="datetimeFigureOut">
               <a:rPr lang="pt-BR" smtClean="0"/>
-              <a:t>27/01/2017</a:t>
+              <a:t>08/04/2020</a:t>
             </a:fld>
             <a:endParaRPr lang="pt-BR"/>
           </a:p>
@@ -1250,13 +1213,6 @@
   <p:clrMapOvr>
     <a:masterClrMapping/>
   </p:clrMapOvr>
-  <p:timing>
-    <p:tnLst>
-      <p:par>
-        <p:cTn id="1" dur="indefinite" restart="never" nodeType="tmRoot"/>
-      </p:par>
-    </p:tnLst>
-  </p:timing>
 </p:sldLayout>
 </file>
 
@@ -1310,10 +1266,9 @@
           </a:lstStyle>
           <a:p>
             <a:r>
-              <a:rPr lang="pt-BR" dirty="0" smtClean="0"/>
+              <a:rPr lang="pt-BR" dirty="0"/>
               <a:t>Clique para editar o título mestre</a:t>
             </a:r>
-            <a:endParaRPr lang="pt-BR" dirty="0"/>
           </a:p>
         </p:txBody>
       </p:sp>
@@ -1339,38 +1294,37 @@
           <a:p>
             <a:pPr lvl="0"/>
             <a:r>
-              <a:rPr lang="pt-BR" smtClean="0"/>
+              <a:rPr lang="pt-BR"/>
               <a:t>Clique para editar o texto mestre</a:t>
             </a:r>
           </a:p>
           <a:p>
             <a:pPr lvl="1"/>
             <a:r>
-              <a:rPr lang="pt-BR" smtClean="0"/>
+              <a:rPr lang="pt-BR"/>
               <a:t>Segundo nível</a:t>
             </a:r>
           </a:p>
           <a:p>
             <a:pPr lvl="2"/>
             <a:r>
-              <a:rPr lang="pt-BR" smtClean="0"/>
+              <a:rPr lang="pt-BR"/>
               <a:t>Terceiro nível</a:t>
             </a:r>
           </a:p>
           <a:p>
             <a:pPr lvl="3"/>
             <a:r>
-              <a:rPr lang="pt-BR" smtClean="0"/>
+              <a:rPr lang="pt-BR"/>
               <a:t>Quarto nível</a:t>
             </a:r>
           </a:p>
           <a:p>
             <a:pPr lvl="4"/>
             <a:r>
-              <a:rPr lang="pt-BR" smtClean="0"/>
+              <a:rPr lang="pt-BR"/>
               <a:t>Quinto nível</a:t>
             </a:r>
-            <a:endParaRPr lang="pt-BR"/>
           </a:p>
         </p:txBody>
       </p:sp>
@@ -1396,38 +1350,37 @@
           <a:p>
             <a:pPr lvl="0"/>
             <a:r>
-              <a:rPr lang="pt-BR" smtClean="0"/>
+              <a:rPr lang="pt-BR"/>
               <a:t>Clique para editar o texto mestre</a:t>
             </a:r>
           </a:p>
           <a:p>
             <a:pPr lvl="1"/>
             <a:r>
-              <a:rPr lang="pt-BR" smtClean="0"/>
+              <a:rPr lang="pt-BR"/>
               <a:t>Segundo nível</a:t>
             </a:r>
           </a:p>
           <a:p>
             <a:pPr lvl="2"/>
             <a:r>
-              <a:rPr lang="pt-BR" smtClean="0"/>
+              <a:rPr lang="pt-BR"/>
               <a:t>Terceiro nível</a:t>
             </a:r>
           </a:p>
           <a:p>
             <a:pPr lvl="3"/>
             <a:r>
-              <a:rPr lang="pt-BR" smtClean="0"/>
+              <a:rPr lang="pt-BR"/>
               <a:t>Quarto nível</a:t>
             </a:r>
           </a:p>
           <a:p>
             <a:pPr lvl="4"/>
             <a:r>
-              <a:rPr lang="pt-BR" smtClean="0"/>
+              <a:rPr lang="pt-BR"/>
               <a:t>Quinto nível</a:t>
             </a:r>
-            <a:endParaRPr lang="pt-BR"/>
           </a:p>
         </p:txBody>
       </p:sp>
@@ -1448,7 +1401,7 @@
           <a:p>
             <a:fld id="{9642BF85-54FF-46CE-B398-87F998CFD60B}" type="datetimeFigureOut">
               <a:rPr lang="pt-BR" smtClean="0"/>
-              <a:t>27/01/2017</a:t>
+              <a:t>08/04/2020</a:t>
             </a:fld>
             <a:endParaRPr lang="pt-BR"/>
           </a:p>
@@ -1506,13 +1459,6 @@
   <p:clrMapOvr>
     <a:masterClrMapping/>
   </p:clrMapOvr>
-  <p:timing>
-    <p:tnLst>
-      <p:par>
-        <p:cTn id="1" dur="indefinite" restart="never" nodeType="tmRoot"/>
-      </p:par>
-    </p:tnLst>
-  </p:timing>
 </p:sldLayout>
 </file>
 
@@ -1554,10 +1500,9 @@
           <a:lstStyle/>
           <a:p>
             <a:r>
-              <a:rPr lang="pt-BR" smtClean="0"/>
+              <a:rPr lang="pt-BR"/>
               <a:t>Clique para editar o título mestre</a:t>
             </a:r>
-            <a:endParaRPr lang="pt-BR"/>
           </a:p>
         </p:txBody>
       </p:sp>
@@ -1620,7 +1565,7 @@
           <a:p>
             <a:pPr lvl="0"/>
             <a:r>
-              <a:rPr lang="pt-BR" smtClean="0"/>
+              <a:rPr lang="pt-BR"/>
               <a:t>Clique para editar o texto mestre</a:t>
             </a:r>
           </a:p>
@@ -1648,38 +1593,37 @@
           <a:p>
             <a:pPr lvl="0"/>
             <a:r>
-              <a:rPr lang="pt-BR" smtClean="0"/>
+              <a:rPr lang="pt-BR"/>
               <a:t>Clique para editar o texto mestre</a:t>
             </a:r>
           </a:p>
           <a:p>
             <a:pPr lvl="1"/>
             <a:r>
-              <a:rPr lang="pt-BR" smtClean="0"/>
+              <a:rPr lang="pt-BR"/>
               <a:t>Segundo nível</a:t>
             </a:r>
           </a:p>
           <a:p>
             <a:pPr lvl="2"/>
             <a:r>
-              <a:rPr lang="pt-BR" smtClean="0"/>
+              <a:rPr lang="pt-BR"/>
               <a:t>Terceiro nível</a:t>
             </a:r>
           </a:p>
           <a:p>
             <a:pPr lvl="3"/>
             <a:r>
-              <a:rPr lang="pt-BR" smtClean="0"/>
+              <a:rPr lang="pt-BR"/>
               <a:t>Quarto nível</a:t>
             </a:r>
           </a:p>
           <a:p>
             <a:pPr lvl="4"/>
             <a:r>
-              <a:rPr lang="pt-BR" smtClean="0"/>
+              <a:rPr lang="pt-BR"/>
               <a:t>Quinto nível</a:t>
             </a:r>
-            <a:endParaRPr lang="pt-BR"/>
           </a:p>
         </p:txBody>
       </p:sp>
@@ -1742,7 +1686,7 @@
           <a:p>
             <a:pPr lvl="0"/>
             <a:r>
-              <a:rPr lang="pt-BR" smtClean="0"/>
+              <a:rPr lang="pt-BR"/>
               <a:t>Clique para editar o texto mestre</a:t>
             </a:r>
           </a:p>
@@ -1770,38 +1714,37 @@
           <a:p>
             <a:pPr lvl="0"/>
             <a:r>
-              <a:rPr lang="pt-BR" smtClean="0"/>
+              <a:rPr lang="pt-BR"/>
               <a:t>Clique para editar o texto mestre</a:t>
             </a:r>
           </a:p>
           <a:p>
             <a:pPr lvl="1"/>
             <a:r>
-              <a:rPr lang="pt-BR" smtClean="0"/>
+              <a:rPr lang="pt-BR"/>
               <a:t>Segundo nível</a:t>
             </a:r>
           </a:p>
           <a:p>
             <a:pPr lvl="2"/>
             <a:r>
-              <a:rPr lang="pt-BR" smtClean="0"/>
+              <a:rPr lang="pt-BR"/>
               <a:t>Terceiro nível</a:t>
             </a:r>
           </a:p>
           <a:p>
             <a:pPr lvl="3"/>
             <a:r>
-              <a:rPr lang="pt-BR" smtClean="0"/>
+              <a:rPr lang="pt-BR"/>
               <a:t>Quarto nível</a:t>
             </a:r>
           </a:p>
           <a:p>
             <a:pPr lvl="4"/>
             <a:r>
-              <a:rPr lang="pt-BR" smtClean="0"/>
+              <a:rPr lang="pt-BR"/>
               <a:t>Quinto nível</a:t>
             </a:r>
-            <a:endParaRPr lang="pt-BR"/>
           </a:p>
         </p:txBody>
       </p:sp>
@@ -1822,7 +1765,7 @@
           <a:p>
             <a:fld id="{9642BF85-54FF-46CE-B398-87F998CFD60B}" type="datetimeFigureOut">
               <a:rPr lang="pt-BR" smtClean="0"/>
-              <a:t>27/01/2017</a:t>
+              <a:t>08/04/2020</a:t>
             </a:fld>
             <a:endParaRPr lang="pt-BR"/>
           </a:p>
@@ -1880,13 +1823,6 @@
   <p:clrMapOvr>
     <a:masterClrMapping/>
   </p:clrMapOvr>
-  <p:timing>
-    <p:tnLst>
-      <p:par>
-        <p:cTn id="1" dur="indefinite" restart="never" nodeType="tmRoot"/>
-      </p:par>
-    </p:tnLst>
-  </p:timing>
 </p:sldLayout>
 </file>
 
@@ -1940,10 +1876,9 @@
           </a:lstStyle>
           <a:p>
             <a:r>
-              <a:rPr lang="pt-BR" smtClean="0"/>
+              <a:rPr lang="pt-BR"/>
               <a:t>Clique para editar o título mestre</a:t>
             </a:r>
-            <a:endParaRPr lang="pt-BR"/>
           </a:p>
         </p:txBody>
       </p:sp>
@@ -1964,7 +1899,7 @@
           <a:p>
             <a:fld id="{9642BF85-54FF-46CE-B398-87F998CFD60B}" type="datetimeFigureOut">
               <a:rPr lang="pt-BR" smtClean="0"/>
-              <a:t>27/01/2017</a:t>
+              <a:t>08/04/2020</a:t>
             </a:fld>
             <a:endParaRPr lang="pt-BR"/>
           </a:p>
@@ -2022,13 +1957,6 @@
   <p:clrMapOvr>
     <a:masterClrMapping/>
   </p:clrMapOvr>
-  <p:timing>
-    <p:tnLst>
-      <p:par>
-        <p:cTn id="1" dur="indefinite" restart="never" nodeType="tmRoot"/>
-      </p:par>
-    </p:tnLst>
-  </p:timing>
 </p:sldLayout>
 </file>
 
@@ -2066,7 +1994,7 @@
           <a:p>
             <a:fld id="{9642BF85-54FF-46CE-B398-87F998CFD60B}" type="datetimeFigureOut">
               <a:rPr lang="pt-BR" smtClean="0"/>
-              <a:t>27/01/2017</a:t>
+              <a:t>08/04/2020</a:t>
             </a:fld>
             <a:endParaRPr lang="pt-BR"/>
           </a:p>
@@ -2124,13 +2052,6 @@
   <p:clrMapOvr>
     <a:masterClrMapping/>
   </p:clrMapOvr>
-  <p:timing>
-    <p:tnLst>
-      <p:par>
-        <p:cTn id="1" dur="indefinite" restart="never" nodeType="tmRoot"/>
-      </p:par>
-    </p:tnLst>
-  </p:timing>
 </p:sldLayout>
 </file>
 
@@ -2176,10 +2097,9 @@
           </a:lstStyle>
           <a:p>
             <a:r>
-              <a:rPr lang="pt-BR" smtClean="0"/>
+              <a:rPr lang="pt-BR"/>
               <a:t>Clique para editar o título mestre</a:t>
             </a:r>
-            <a:endParaRPr lang="pt-BR"/>
           </a:p>
         </p:txBody>
       </p:sp>
@@ -2233,38 +2153,37 @@
           <a:p>
             <a:pPr lvl="0"/>
             <a:r>
-              <a:rPr lang="pt-BR" smtClean="0"/>
+              <a:rPr lang="pt-BR"/>
               <a:t>Clique para editar o texto mestre</a:t>
             </a:r>
           </a:p>
           <a:p>
             <a:pPr lvl="1"/>
             <a:r>
-              <a:rPr lang="pt-BR" smtClean="0"/>
+              <a:rPr lang="pt-BR"/>
               <a:t>Segundo nível</a:t>
             </a:r>
           </a:p>
           <a:p>
             <a:pPr lvl="2"/>
             <a:r>
-              <a:rPr lang="pt-BR" smtClean="0"/>
+              <a:rPr lang="pt-BR"/>
               <a:t>Terceiro nível</a:t>
             </a:r>
           </a:p>
           <a:p>
             <a:pPr lvl="3"/>
             <a:r>
-              <a:rPr lang="pt-BR" smtClean="0"/>
+              <a:rPr lang="pt-BR"/>
               <a:t>Quarto nível</a:t>
             </a:r>
           </a:p>
           <a:p>
             <a:pPr lvl="4"/>
             <a:r>
-              <a:rPr lang="pt-BR" smtClean="0"/>
+              <a:rPr lang="pt-BR"/>
               <a:t>Quinto nível</a:t>
             </a:r>
-            <a:endParaRPr lang="pt-BR"/>
           </a:p>
         </p:txBody>
       </p:sp>
@@ -2327,7 +2246,7 @@
           <a:p>
             <a:pPr lvl="0"/>
             <a:r>
-              <a:rPr lang="pt-BR" smtClean="0"/>
+              <a:rPr lang="pt-BR"/>
               <a:t>Clique para editar o texto mestre</a:t>
             </a:r>
           </a:p>
@@ -2350,7 +2269,7 @@
           <a:p>
             <a:fld id="{9642BF85-54FF-46CE-B398-87F998CFD60B}" type="datetimeFigureOut">
               <a:rPr lang="pt-BR" smtClean="0"/>
-              <a:t>27/01/2017</a:t>
+              <a:t>08/04/2020</a:t>
             </a:fld>
             <a:endParaRPr lang="pt-BR"/>
           </a:p>
@@ -2408,13 +2327,6 @@
   <p:clrMapOvr>
     <a:masterClrMapping/>
   </p:clrMapOvr>
-  <p:timing>
-    <p:tnLst>
-      <p:par>
-        <p:cTn id="1" dur="indefinite" restart="never" nodeType="tmRoot"/>
-      </p:par>
-    </p:tnLst>
-  </p:timing>
 </p:sldLayout>
 </file>
 
@@ -2460,10 +2372,9 @@
           </a:lstStyle>
           <a:p>
             <a:r>
-              <a:rPr lang="pt-BR" smtClean="0"/>
+              <a:rPr lang="pt-BR"/>
               <a:t>Clique para editar o título mestre</a:t>
             </a:r>
-            <a:endParaRPr lang="pt-BR"/>
           </a:p>
         </p:txBody>
       </p:sp>
@@ -2587,7 +2498,7 @@
           <a:p>
             <a:pPr lvl="0"/>
             <a:r>
-              <a:rPr lang="pt-BR" smtClean="0"/>
+              <a:rPr lang="pt-BR"/>
               <a:t>Clique para editar o texto mestre</a:t>
             </a:r>
           </a:p>
@@ -2610,7 +2521,7 @@
           <a:p>
             <a:fld id="{9642BF85-54FF-46CE-B398-87F998CFD60B}" type="datetimeFigureOut">
               <a:rPr lang="pt-BR" smtClean="0"/>
-              <a:t>27/01/2017</a:t>
+              <a:t>08/04/2020</a:t>
             </a:fld>
             <a:endParaRPr lang="pt-BR"/>
           </a:p>
@@ -2668,13 +2579,6 @@
   <p:clrMapOvr>
     <a:masterClrMapping/>
   </p:clrMapOvr>
-  <p:timing>
-    <p:tnLst>
-      <p:par>
-        <p:cTn id="1" dur="indefinite" restart="never" nodeType="tmRoot"/>
-      </p:par>
-    </p:tnLst>
-  </p:timing>
 </p:sldLayout>
 </file>
 
@@ -2735,10 +2639,9 @@
           <a:lstStyle/>
           <a:p>
             <a:r>
-              <a:rPr lang="pt-BR" dirty="0" smtClean="0"/>
+              <a:rPr lang="pt-BR" dirty="0"/>
               <a:t>Clique para editar o título mestre</a:t>
             </a:r>
-            <a:endParaRPr lang="pt-BR" dirty="0"/>
           </a:p>
         </p:txBody>
       </p:sp>
@@ -2769,38 +2672,37 @@
           <a:p>
             <a:pPr lvl="0"/>
             <a:r>
-              <a:rPr lang="pt-BR" dirty="0" smtClean="0"/>
+              <a:rPr lang="pt-BR" dirty="0"/>
               <a:t>Clique para editar o texto mestre</a:t>
             </a:r>
           </a:p>
           <a:p>
             <a:pPr lvl="1"/>
             <a:r>
-              <a:rPr lang="pt-BR" dirty="0" smtClean="0"/>
+              <a:rPr lang="pt-BR" dirty="0"/>
               <a:t>Segundo nível</a:t>
             </a:r>
           </a:p>
           <a:p>
             <a:pPr lvl="2"/>
             <a:r>
-              <a:rPr lang="pt-BR" dirty="0" smtClean="0"/>
+              <a:rPr lang="pt-BR" dirty="0"/>
               <a:t>Terceiro nível</a:t>
             </a:r>
           </a:p>
           <a:p>
             <a:pPr lvl="3"/>
             <a:r>
-              <a:rPr lang="pt-BR" dirty="0" smtClean="0"/>
+              <a:rPr lang="pt-BR" dirty="0"/>
               <a:t>Quarto nível</a:t>
             </a:r>
           </a:p>
           <a:p>
             <a:pPr lvl="4"/>
             <a:r>
-              <a:rPr lang="pt-BR" dirty="0" smtClean="0"/>
+              <a:rPr lang="pt-BR" dirty="0"/>
               <a:t>Quinto nível</a:t>
             </a:r>
-            <a:endParaRPr lang="pt-BR" dirty="0"/>
           </a:p>
         </p:txBody>
       </p:sp>
@@ -2839,7 +2741,7 @@
           <a:p>
             <a:fld id="{9642BF85-54FF-46CE-B398-87F998CFD60B}" type="datetimeFigureOut">
               <a:rPr lang="pt-BR" smtClean="0"/>
-              <a:t>27/01/2017</a:t>
+              <a:t>08/04/2020</a:t>
             </a:fld>
             <a:endParaRPr lang="pt-BR"/>
           </a:p>
@@ -2944,13 +2846,6 @@
     <p:sldLayoutId id="2147483658" r:id="rId10"/>
     <p:sldLayoutId id="2147483659" r:id="rId11"/>
   </p:sldLayoutIdLst>
-  <p:timing>
-    <p:tnLst>
-      <p:par>
-        <p:cTn id="1" dur="indefinite" restart="never" nodeType="tmRoot"/>
-      </p:par>
-    </p:tnLst>
-  </p:timing>
   <p:txStyles>
     <p:titleStyle>
       <a:lvl1pPr algn="l" defTabSz="914400" rtl="0" eaLnBrk="1" latinLnBrk="0" hangingPunct="1">
@@ -3284,7 +3179,7 @@
           <a:lstStyle/>
           <a:p>
             <a:r>
-              <a:rPr lang="pt-BR" dirty="0" smtClean="0">
+              <a:rPr lang="pt-BR" dirty="0">
                 <a:solidFill>
                   <a:srgbClr val="014A8E"/>
                 </a:solidFill>
@@ -3306,13 +3201,6 @@
   <p:clrMapOvr>
     <a:masterClrMapping/>
   </p:clrMapOvr>
-  <p:timing>
-    <p:tnLst>
-      <p:par>
-        <p:cTn id="1" dur="indefinite" restart="never" nodeType="tmRoot"/>
-      </p:par>
-    </p:tnLst>
-  </p:timing>
 </p:sld>
 </file>
 
@@ -3349,10 +3237,9 @@
           <a:lstStyle/>
           <a:p>
             <a:r>
-              <a:rPr lang="pt-BR" dirty="0" smtClean="0"/>
+              <a:rPr lang="pt-BR" dirty="0"/>
               <a:t>Lógica de Programação</a:t>
             </a:r>
-            <a:endParaRPr lang="pt-BR" dirty="0"/>
           </a:p>
         </p:txBody>
       </p:sp>
@@ -3373,29 +3260,8 @@
           <a:p>
             <a:r>
               <a:rPr lang="pt-BR" dirty="0"/>
-              <a:t>É a técnica de desenvolver algoritmos </a:t>
-            </a:r>
-            <a:r>
-              <a:rPr lang="pt-BR" dirty="0" smtClean="0"/>
-              <a:t>para </a:t>
-            </a:r>
-            <a:r>
-              <a:rPr lang="pt-BR" dirty="0"/>
-              <a:t>atingir determinados objetivos dentro de certas regras baseadas na </a:t>
-            </a:r>
-            <a:r>
-              <a:rPr lang="pt-BR" dirty="0" smtClean="0"/>
-              <a:t>lógica </a:t>
-            </a:r>
-            <a:r>
-              <a:rPr lang="pt-BR" dirty="0"/>
-              <a:t>matemática e em outras teorias básicas da Ciência da </a:t>
-            </a:r>
-            <a:r>
-              <a:rPr lang="pt-BR" dirty="0" smtClean="0"/>
-              <a:t>Computação.</a:t>
-            </a:r>
-            <a:endParaRPr lang="pt-BR" dirty="0"/>
+              <a:t>É a técnica de desenvolver algoritmos para atingir determinados objetivos dentro de certas regras baseadas na lógica matemática e em outras teorias básicas da Ciência da Computação.</a:t>
+            </a:r>
           </a:p>
         </p:txBody>
       </p:sp>
@@ -3409,13 +3275,6 @@
   <p:clrMapOvr>
     <a:masterClrMapping/>
   </p:clrMapOvr>
-  <p:timing>
-    <p:tnLst>
-      <p:par>
-        <p:cTn id="1" dur="indefinite" restart="never" nodeType="tmRoot"/>
-      </p:par>
-    </p:tnLst>
-  </p:timing>
 </p:sld>
 </file>
 
@@ -3452,10 +3311,9 @@
           <a:lstStyle/>
           <a:p>
             <a:r>
-              <a:rPr lang="pt-BR" dirty="0" smtClean="0"/>
+              <a:rPr lang="pt-BR" dirty="0"/>
               <a:t>Algoritmo</a:t>
             </a:r>
-            <a:endParaRPr lang="pt-BR" dirty="0"/>
           </a:p>
         </p:txBody>
       </p:sp>
@@ -3491,13 +3349,6 @@
   <p:clrMapOvr>
     <a:masterClrMapping/>
   </p:clrMapOvr>
-  <p:timing>
-    <p:tnLst>
-      <p:par>
-        <p:cTn id="1" dur="indefinite" restart="never" nodeType="tmRoot"/>
-      </p:par>
-    </p:tnLst>
-  </p:timing>
 </p:sld>
 </file>
 
@@ -3533,6 +3384,130 @@
           <a:bodyPr/>
           <a:lstStyle/>
           <a:p>
+            <a:r>
+              <a:rPr lang="pt-BR" dirty="0"/>
+              <a:t>         Hora do Código</a:t>
+            </a:r>
+          </a:p>
+        </p:txBody>
+      </p:sp>
+      <p:sp>
+        <p:nvSpPr>
+          <p:cNvPr id="3" name="Espaço Reservado para Conteúdo 2"/>
+          <p:cNvSpPr>
+            <a:spLocks noGrp="1"/>
+          </p:cNvSpPr>
+          <p:nvPr>
+            <p:ph idx="1"/>
+          </p:nvPr>
+        </p:nvSpPr>
+        <p:spPr/>
+        <p:txBody>
+          <a:bodyPr/>
+          <a:lstStyle/>
+          <a:p>
+            <a:r>
+              <a:rPr lang="pt-BR" dirty="0"/>
+              <a:t>A Hora do Código é um movimento global que atinge dezenas de milhões de estudantes em mais de 180 países. Qualquer um, em qualquer lugar, pode organizar um evento da Hora do Código. Tutoriais de uma hora estão disponíveis em mais de 45 idiomas. Não é necessário experiência. Ideal para as pessoas de 4 a 104 anos.</a:t>
+            </a:r>
+          </a:p>
+          <a:p>
+            <a:endParaRPr lang="pt-BR" dirty="0"/>
+          </a:p>
+          <a:p>
+            <a:r>
+              <a:rPr lang="pt-BR" i="1" dirty="0"/>
+              <a:t>https://hourofcode.com/br</a:t>
+            </a:r>
+          </a:p>
+        </p:txBody>
+      </p:sp>
+      <p:pic>
+        <p:nvPicPr>
+          <p:cNvPr id="5" name="Picture 2" descr="Hora do Código"/>
+          <p:cNvPicPr>
+            <a:picLocks noChangeAspect="1" noChangeArrowheads="1"/>
+          </p:cNvPicPr>
+          <p:nvPr/>
+        </p:nvPicPr>
+        <p:blipFill>
+          <a:blip r:embed="rId2" cstate="print">
+            <a:extLst>
+              <a:ext uri="{28A0092B-C50C-407E-A947-70E740481C1C}">
+                <a14:useLocalDpi xmlns:a14="http://schemas.microsoft.com/office/drawing/2010/main" val="0"/>
+              </a:ext>
+            </a:extLst>
+          </a:blip>
+          <a:srcRect/>
+          <a:stretch>
+            <a:fillRect/>
+          </a:stretch>
+        </p:blipFill>
+        <p:spPr bwMode="auto">
+          <a:xfrm>
+            <a:off x="3521126" y="224449"/>
+            <a:ext cx="895303" cy="895303"/>
+          </a:xfrm>
+          <a:prstGeom prst="rect">
+            <a:avLst/>
+          </a:prstGeom>
+          <a:noFill/>
+          <a:extLst>
+            <a:ext uri="{909E8E84-426E-40DD-AFC4-6F175D3DCCD1}">
+              <a14:hiddenFill xmlns:a14="http://schemas.microsoft.com/office/drawing/2010/main">
+                <a:solidFill>
+                  <a:srgbClr val="FFFFFF"/>
+                </a:solidFill>
+              </a14:hiddenFill>
+            </a:ext>
+          </a:extLst>
+        </p:spPr>
+      </p:pic>
+    </p:spTree>
+    <p:extLst>
+      <p:ext uri="{BB962C8B-B14F-4D97-AF65-F5344CB8AC3E}">
+        <p14:creationId xmlns:p14="http://schemas.microsoft.com/office/powerpoint/2010/main" val="2904386154"/>
+      </p:ext>
+    </p:extLst>
+  </p:cSld>
+  <p:clrMapOvr>
+    <a:masterClrMapping/>
+  </p:clrMapOvr>
+</p:sld>
+</file>
+
+<file path=ppt/slides/slide5.xml><?xml version="1.0" encoding="utf-8"?>
+<p:sld xmlns:a="http://schemas.openxmlformats.org/drawingml/2006/main" xmlns:r="http://schemas.openxmlformats.org/officeDocument/2006/relationships" xmlns:p="http://schemas.openxmlformats.org/presentationml/2006/main">
+  <p:cSld>
+    <p:spTree>
+      <p:nvGrpSpPr>
+        <p:cNvPr id="1" name=""/>
+        <p:cNvGrpSpPr/>
+        <p:nvPr/>
+      </p:nvGrpSpPr>
+      <p:grpSpPr>
+        <a:xfrm>
+          <a:off x="0" y="0"/>
+          <a:ext cx="0" cy="0"/>
+          <a:chOff x="0" y="0"/>
+          <a:chExt cx="0" cy="0"/>
+        </a:xfrm>
+      </p:grpSpPr>
+      <p:sp>
+        <p:nvSpPr>
+          <p:cNvPr id="2" name="Título 1"/>
+          <p:cNvSpPr>
+            <a:spLocks noGrp="1"/>
+          </p:cNvSpPr>
+          <p:nvPr>
+            <p:ph type="title"/>
+          </p:nvPr>
+        </p:nvSpPr>
+        <p:spPr/>
+        <p:txBody>
+          <a:bodyPr/>
+          <a:lstStyle/>
+          <a:p>
             <a:endParaRPr lang="pt-BR"/>
           </a:p>
         </p:txBody>
@@ -3564,27 +3539,7 @@
             </a:r>
             <a:r>
               <a:rPr lang="pt-BR" dirty="0"/>
-              <a:t>, </a:t>
-            </a:r>
-            <a:r>
-              <a:rPr lang="pt-BR" dirty="0" smtClean="0"/>
-              <a:t>você pode programar seus próprios </a:t>
-            </a:r>
-            <a:r>
-              <a:rPr lang="pt-BR" dirty="0"/>
-              <a:t>jogos e animações </a:t>
-            </a:r>
-            <a:r>
-              <a:rPr lang="pt-BR" dirty="0" smtClean="0"/>
-              <a:t>interativos, além de compartilhar </a:t>
-            </a:r>
-            <a:r>
-              <a:rPr lang="pt-BR" dirty="0"/>
-              <a:t>as suas criações com </a:t>
-            </a:r>
-            <a:r>
-              <a:rPr lang="pt-BR" dirty="0" smtClean="0"/>
-              <a:t>outras pessoas da comunidade.</a:t>
+              <a:t>, você pode programar seus próprios jogos e animações interativos, além de compartilhar as suas criações com outras pessoas da comunidade.</a:t>
             </a:r>
           </a:p>
           <a:p>
@@ -3604,11 +3559,11 @@
               <a:t> ajuda os jovens a pensar de forma criativa, a raciocinar sistematicamente e a trabalhar </a:t>
             </a:r>
             <a:r>
-              <a:rPr lang="pt-BR" dirty="0" err="1" smtClean="0"/>
+              <a:rPr lang="pt-BR" dirty="0" err="1"/>
               <a:t>colaborativamente</a:t>
             </a:r>
             <a:r>
-              <a:rPr lang="pt-BR" dirty="0" smtClean="0"/>
+              <a:rPr lang="pt-BR" dirty="0"/>
               <a:t>.</a:t>
             </a:r>
           </a:p>
@@ -3674,149 +3629,6 @@
   <p:clrMapOvr>
     <a:masterClrMapping/>
   </p:clrMapOvr>
-  <p:timing>
-    <p:tnLst>
-      <p:par>
-        <p:cTn id="1" dur="indefinite" restart="never" nodeType="tmRoot"/>
-      </p:par>
-    </p:tnLst>
-  </p:timing>
-</p:sld>
-</file>
-
-<file path=ppt/slides/slide5.xml><?xml version="1.0" encoding="utf-8"?>
-<p:sld xmlns:a="http://schemas.openxmlformats.org/drawingml/2006/main" xmlns:r="http://schemas.openxmlformats.org/officeDocument/2006/relationships" xmlns:p="http://schemas.openxmlformats.org/presentationml/2006/main">
-  <p:cSld>
-    <p:spTree>
-      <p:nvGrpSpPr>
-        <p:cNvPr id="1" name=""/>
-        <p:cNvGrpSpPr/>
-        <p:nvPr/>
-      </p:nvGrpSpPr>
-      <p:grpSpPr>
-        <a:xfrm>
-          <a:off x="0" y="0"/>
-          <a:ext cx="0" cy="0"/>
-          <a:chOff x="0" y="0"/>
-          <a:chExt cx="0" cy="0"/>
-        </a:xfrm>
-      </p:grpSpPr>
-      <p:sp>
-        <p:nvSpPr>
-          <p:cNvPr id="2" name="Título 1"/>
-          <p:cNvSpPr>
-            <a:spLocks noGrp="1"/>
-          </p:cNvSpPr>
-          <p:nvPr>
-            <p:ph type="title"/>
-          </p:nvPr>
-        </p:nvSpPr>
-        <p:spPr/>
-        <p:txBody>
-          <a:bodyPr/>
-          <a:lstStyle/>
-          <a:p>
-            <a:r>
-              <a:rPr lang="pt-BR" dirty="0" smtClean="0"/>
-              <a:t>         Hora do Código</a:t>
-            </a:r>
-            <a:endParaRPr lang="pt-BR" dirty="0"/>
-          </a:p>
-        </p:txBody>
-      </p:sp>
-      <p:sp>
-        <p:nvSpPr>
-          <p:cNvPr id="3" name="Espaço Reservado para Conteúdo 2"/>
-          <p:cNvSpPr>
-            <a:spLocks noGrp="1"/>
-          </p:cNvSpPr>
-          <p:nvPr>
-            <p:ph idx="1"/>
-          </p:nvPr>
-        </p:nvSpPr>
-        <p:spPr/>
-        <p:txBody>
-          <a:bodyPr/>
-          <a:lstStyle/>
-          <a:p>
-            <a:r>
-              <a:rPr lang="pt-BR" dirty="0"/>
-              <a:t>A Hora do Código é um movimento global que atinge dezenas de milhões de estudantes em mais de 180 países. Qualquer um, em qualquer lugar, pode organizar um evento da Hora do Código. Tutoriais de uma hora estão disponíveis em mais de 45 idiomas. Não é necessário experiência. Ideal para as pessoas de 4 a 104 anos</a:t>
-            </a:r>
-            <a:r>
-              <a:rPr lang="pt-BR" dirty="0" smtClean="0"/>
-              <a:t>.</a:t>
-            </a:r>
-          </a:p>
-          <a:p>
-            <a:endParaRPr lang="pt-BR" dirty="0"/>
-          </a:p>
-          <a:p>
-            <a:r>
-              <a:rPr lang="pt-BR" i="1" dirty="0"/>
-              <a:t>https://hourofcode.com/br</a:t>
-            </a:r>
-          </a:p>
-        </p:txBody>
-      </p:sp>
-      <p:pic>
-        <p:nvPicPr>
-          <p:cNvPr id="5" name="Picture 2" descr="Hora do Código"/>
-          <p:cNvPicPr>
-            <a:picLocks noChangeAspect="1" noChangeArrowheads="1"/>
-          </p:cNvPicPr>
-          <p:nvPr/>
-        </p:nvPicPr>
-        <p:blipFill>
-          <a:blip r:embed="rId2" cstate="print">
-            <a:extLst>
-              <a:ext uri="{28A0092B-C50C-407E-A947-70E740481C1C}">
-                <a14:useLocalDpi xmlns:a14="http://schemas.microsoft.com/office/drawing/2010/main" val="0"/>
-              </a:ext>
-            </a:extLst>
-          </a:blip>
-          <a:srcRect/>
-          <a:stretch>
-            <a:fillRect/>
-          </a:stretch>
-        </p:blipFill>
-        <p:spPr bwMode="auto">
-          <a:xfrm>
-            <a:off x="3521126" y="224449"/>
-            <a:ext cx="895303" cy="895303"/>
-          </a:xfrm>
-          <a:prstGeom prst="rect">
-            <a:avLst/>
-          </a:prstGeom>
-          <a:noFill/>
-          <a:extLst>
-            <a:ext uri="{909E8E84-426E-40DD-AFC4-6F175D3DCCD1}">
-              <a14:hiddenFill xmlns:a14="http://schemas.microsoft.com/office/drawing/2010/main">
-                <a:solidFill>
-                  <a:srgbClr val="FFFFFF"/>
-                </a:solidFill>
-              </a14:hiddenFill>
-            </a:ext>
-          </a:extLst>
-        </p:spPr>
-      </p:pic>
-    </p:spTree>
-    <p:extLst>
-      <p:ext uri="{BB962C8B-B14F-4D97-AF65-F5344CB8AC3E}">
-        <p14:creationId xmlns:p14="http://schemas.microsoft.com/office/powerpoint/2010/main" val="2904386154"/>
-      </p:ext>
-    </p:extLst>
-  </p:cSld>
-  <p:clrMapOvr>
-    <a:masterClrMapping/>
-  </p:clrMapOvr>
-  <p:timing>
-    <p:tnLst>
-      <p:par>
-        <p:cTn id="1" dur="indefinite" restart="never" nodeType="tmRoot"/>
-      </p:par>
-    </p:tnLst>
-  </p:timing>
 </p:sld>
 </file>
 

</xml_diff>